<commit_message>
updates to testing environment
To make it easier for other users to test the script, sample testing data is moved to a folder, and the readme is updated to match that.
</commit_message>
<xml_diff>
--- a/pci_poster/poster_template.pptx
+++ b/pci_poster/poster_template.pptx
@@ -115,8 +115,7 @@
 <file path=ppt/revisionInfo.xml><?xml version="1.0" encoding="utf-8"?>
 <p1510:revInfo xmlns:a="http://schemas.openxmlformats.org/drawingml/2006/main" xmlns:r="http://schemas.openxmlformats.org/officeDocument/2006/relationships" xmlns:p1510="http://schemas.microsoft.com/office/powerpoint/2015/10/main">
   <p1510:revLst>
-    <p1510:client id="{A5BB3A64-C60C-45E9-BAE7-11B96E1E2D18}" v="69" dt="2026-01-14T08:58:47.802"/>
-    <p1510:client id="{E1DC7D8A-5337-4AAE-9935-D0A80B248513}" v="376" dt="2026-01-13T09:38:14.758"/>
+    <p1510:client id="{A5BB3A64-C60C-45E9-BAE7-11B96E1E2D18}" v="71" dt="2026-01-14T09:54:05.797"/>
   </p1510:revLst>
 </p1510:revInfo>
 </file>
@@ -125,13 +124,60 @@
 <pc:chgInfo xmlns:a="http://schemas.openxmlformats.org/drawingml/2006/main" xmlns:r="http://schemas.openxmlformats.org/officeDocument/2006/relationships" xmlns:ac="http://schemas.microsoft.com/office/drawing/2013/main/command" xmlns:pc="http://schemas.microsoft.com/office/powerpoint/2013/main/command">
   <pc:docChgLst>
     <pc:chgData name="Gillett, Richard" userId="f751afb3-89ee-4adb-bf46-b352b62550b4" providerId="ADAL" clId="{A5BB3A64-C60C-45E9-BAE7-11B96E1E2D18}"/>
-    <pc:docChg chg="undo custSel modMainMaster">
-      <pc:chgData name="Gillett, Richard" userId="f751afb3-89ee-4adb-bf46-b352b62550b4" providerId="ADAL" clId="{A5BB3A64-C60C-45E9-BAE7-11B96E1E2D18}" dt="2026-01-14T08:59:03.576" v="211" actId="207"/>
+    <pc:docChg chg="undo custSel modSld modMainMaster">
+      <pc:chgData name="Gillett, Richard" userId="f751afb3-89ee-4adb-bf46-b352b62550b4" providerId="ADAL" clId="{A5BB3A64-C60C-45E9-BAE7-11B96E1E2D18}" dt="2026-01-14T09:55:55.459" v="251" actId="14100"/>
       <pc:docMkLst>
         <pc:docMk/>
       </pc:docMkLst>
+      <pc:sldChg chg="modSp mod">
+        <pc:chgData name="Gillett, Richard" userId="f751afb3-89ee-4adb-bf46-b352b62550b4" providerId="ADAL" clId="{A5BB3A64-C60C-45E9-BAE7-11B96E1E2D18}" dt="2026-01-14T09:55:55.459" v="251" actId="14100"/>
+        <pc:sldMkLst>
+          <pc:docMk/>
+          <pc:sldMk cId="4050248657" sldId="258"/>
+        </pc:sldMkLst>
+        <pc:spChg chg="mod">
+          <ac:chgData name="Gillett, Richard" userId="f751afb3-89ee-4adb-bf46-b352b62550b4" providerId="ADAL" clId="{A5BB3A64-C60C-45E9-BAE7-11B96E1E2D18}" dt="2026-01-14T09:55:37.491" v="248" actId="14100"/>
+          <ac:spMkLst>
+            <pc:docMk/>
+            <pc:sldMk cId="4050248657" sldId="258"/>
+            <ac:spMk id="2" creationId="{F4F36A85-40C1-99E5-A3BA-3666774AE73E}"/>
+          </ac:spMkLst>
+        </pc:spChg>
+        <pc:spChg chg="mod">
+          <ac:chgData name="Gillett, Richard" userId="f751afb3-89ee-4adb-bf46-b352b62550b4" providerId="ADAL" clId="{A5BB3A64-C60C-45E9-BAE7-11B96E1E2D18}" dt="2026-01-14T09:55:55.459" v="251" actId="14100"/>
+          <ac:spMkLst>
+            <pc:docMk/>
+            <pc:sldMk cId="4050248657" sldId="258"/>
+            <ac:spMk id="3" creationId="{376C39B9-C8C6-2B76-BE87-956DBD5F86B7}"/>
+          </ac:spMkLst>
+        </pc:spChg>
+        <pc:spChg chg="mod">
+          <ac:chgData name="Gillett, Richard" userId="f751afb3-89ee-4adb-bf46-b352b62550b4" providerId="ADAL" clId="{A5BB3A64-C60C-45E9-BAE7-11B96E1E2D18}" dt="2026-01-14T09:55:45.683" v="250" actId="1076"/>
+          <ac:spMkLst>
+            <pc:docMk/>
+            <pc:sldMk cId="4050248657" sldId="258"/>
+            <ac:spMk id="5" creationId="{6CF5C07D-A98D-DF62-0C9B-BAA4238D66ED}"/>
+          </ac:spMkLst>
+        </pc:spChg>
+        <pc:spChg chg="mod">
+          <ac:chgData name="Gillett, Richard" userId="f751afb3-89ee-4adb-bf46-b352b62550b4" providerId="ADAL" clId="{A5BB3A64-C60C-45E9-BAE7-11B96E1E2D18}" dt="2026-01-14T09:55:42.353" v="249" actId="1076"/>
+          <ac:spMkLst>
+            <pc:docMk/>
+            <pc:sldMk cId="4050248657" sldId="258"/>
+            <ac:spMk id="6" creationId="{4D0EF5F5-7D75-0122-641F-0ACF5C0197B5}"/>
+          </ac:spMkLst>
+        </pc:spChg>
+        <pc:spChg chg="mod">
+          <ac:chgData name="Gillett, Richard" userId="f751afb3-89ee-4adb-bf46-b352b62550b4" providerId="ADAL" clId="{A5BB3A64-C60C-45E9-BAE7-11B96E1E2D18}" dt="2026-01-14T09:55:24.531" v="247" actId="14100"/>
+          <ac:spMkLst>
+            <pc:docMk/>
+            <pc:sldMk cId="4050248657" sldId="258"/>
+            <ac:spMk id="9" creationId="{F98833C7-4F68-7FFA-40F5-A320C257F350}"/>
+          </ac:spMkLst>
+        </pc:spChg>
+      </pc:sldChg>
       <pc:sldMasterChg chg="addSp delSp modSp mod modSldLayout">
-        <pc:chgData name="Gillett, Richard" userId="f751afb3-89ee-4adb-bf46-b352b62550b4" providerId="ADAL" clId="{A5BB3A64-C60C-45E9-BAE7-11B96E1E2D18}" dt="2026-01-14T08:59:03.576" v="211" actId="207"/>
+        <pc:chgData name="Gillett, Richard" userId="f751afb3-89ee-4adb-bf46-b352b62550b4" providerId="ADAL" clId="{A5BB3A64-C60C-45E9-BAE7-11B96E1E2D18}" dt="2026-01-14T09:54:56.492" v="245" actId="122"/>
         <pc:sldMasterMkLst>
           <pc:docMk/>
           <pc:sldMasterMk cId="2640799190" sldId="2147483660"/>
@@ -232,15 +278,24 @@
             <ac:picMk id="1026" creationId="{950F8600-D76B-F4BC-D083-131E82D37775}"/>
           </ac:picMkLst>
         </pc:picChg>
-        <pc:sldLayoutChg chg="addSp modSp mod">
-          <pc:chgData name="Gillett, Richard" userId="f751afb3-89ee-4adb-bf46-b352b62550b4" providerId="ADAL" clId="{A5BB3A64-C60C-45E9-BAE7-11B96E1E2D18}" dt="2026-01-14T08:59:03.576" v="211" actId="207"/>
+        <pc:sldLayoutChg chg="addSp delSp modSp mod">
+          <pc:chgData name="Gillett, Richard" userId="f751afb3-89ee-4adb-bf46-b352b62550b4" providerId="ADAL" clId="{A5BB3A64-C60C-45E9-BAE7-11B96E1E2D18}" dt="2026-01-14T09:54:56.492" v="245" actId="122"/>
           <pc:sldLayoutMkLst>
             <pc:docMk/>
             <pc:sldMasterMk cId="2640799190" sldId="2147483660"/>
             <pc:sldLayoutMk cId="1363397331" sldId="2147483661"/>
           </pc:sldLayoutMkLst>
           <pc:spChg chg="add mod">
-            <ac:chgData name="Gillett, Richard" userId="f751afb3-89ee-4adb-bf46-b352b62550b4" providerId="ADAL" clId="{A5BB3A64-C60C-45E9-BAE7-11B96E1E2D18}" dt="2026-01-14T08:59:03.576" v="211" actId="207"/>
+            <ac:chgData name="Gillett, Richard" userId="f751afb3-89ee-4adb-bf46-b352b62550b4" providerId="ADAL" clId="{A5BB3A64-C60C-45E9-BAE7-11B96E1E2D18}" dt="2026-01-14T09:54:56.492" v="245" actId="122"/>
+            <ac:spMkLst>
+              <pc:docMk/>
+              <pc:sldMasterMk cId="2640799190" sldId="2147483660"/>
+              <pc:sldLayoutMk cId="1363397331" sldId="2147483661"/>
+              <ac:spMk id="2" creationId="{4EA715C1-D099-5522-9B8D-6FE225FA3DB4}"/>
+            </ac:spMkLst>
+          </pc:spChg>
+          <pc:spChg chg="add del mod">
+            <ac:chgData name="Gillett, Richard" userId="f751afb3-89ee-4adb-bf46-b352b62550b4" providerId="ADAL" clId="{A5BB3A64-C60C-45E9-BAE7-11B96E1E2D18}" dt="2026-01-14T09:53:55.812" v="213" actId="478"/>
             <ac:spMkLst>
               <pc:docMk/>
               <pc:sldMasterMk cId="2640799190" sldId="2147483660"/>
@@ -1605,7 +1660,7 @@
           <p:nvPr userDrawn="1"/>
         </p:nvPicPr>
         <p:blipFill>
-          <a:blip r:embed="rId2">
+          <a:blip r:embed="rId2" cstate="hqprint">
             <a:clrChange>
               <a:clrFrom>
                 <a:srgbClr val="E8F2F3"/>
@@ -1621,17 +1676,20 @@
                 <a14:imgProps xmlns:a14="http://schemas.microsoft.com/office/drawing/2010/main">
                   <a14:imgLayer r:embed="rId3">
                     <a14:imgEffect>
-                      <a14:backgroundRemoval t="54557" b="96289" l="57493" r="95277">
-                        <a14:foregroundMark x1="80007" y1="96289" x2="80007" y2="96289"/>
-                        <a14:foregroundMark x1="77131" y1="95833" x2="79510" y2="89909"/>
+                      <a14:backgroundRemoval t="0" b="95103" l="0" r="100000">
+                        <a14:foregroundMark x1="78925" y1="95261" x2="78925" y2="95261"/>
+                        <a14:foregroundMark x1="61505" y1="94155" x2="75914" y2="79779"/>
                       </a14:backgroundRemoval>
                     </a14:imgEffect>
                   </a14:imgLayer>
                 </a14:imgProps>
               </a:ext>
+              <a:ext uri="{28A0092B-C50C-407E-A947-70E740481C1C}">
+                <a14:useLocalDpi xmlns:a14="http://schemas.microsoft.com/office/drawing/2010/main"/>
+              </a:ext>
             </a:extLst>
           </a:blip>
-          <a:srcRect l="66973" t="57024" r="16524" b="1734"/>
+          <a:srcRect/>
           <a:stretch/>
         </p:blipFill>
         <p:spPr>
@@ -1689,7 +1747,7 @@
           <p:nvPr userDrawn="1"/>
         </p:nvPicPr>
         <p:blipFill>
-          <a:blip r:embed="rId5">
+          <a:blip r:embed="rId5" cstate="hqprint">
             <a:extLst>
               <a:ext uri="{BEBA8EAE-BF5A-486C-A8C5-ECC9F3942E4B}">
                 <a14:imgProps xmlns:a14="http://schemas.microsoft.com/office/drawing/2010/main">
@@ -1699,6 +1757,9 @@
                     </a14:imgEffect>
                   </a14:imgLayer>
                 </a14:imgProps>
+              </a:ext>
+              <a:ext uri="{28A0092B-C50C-407E-A947-70E740481C1C}">
+                <a14:useLocalDpi xmlns:a14="http://schemas.microsoft.com/office/drawing/2010/main"/>
               </a:ext>
             </a:extLst>
           </a:blip>
@@ -1767,10 +1828,10 @@
           <p:nvPr userDrawn="1"/>
         </p:nvPicPr>
         <p:blipFill>
-          <a:blip r:embed="rId8">
+          <a:blip r:embed="rId8" cstate="hqprint">
             <a:extLst>
               <a:ext uri="{28A0092B-C50C-407E-A947-70E740481C1C}">
-                <a14:useLocalDpi xmlns:a14="http://schemas.microsoft.com/office/drawing/2010/main" val="0"/>
+                <a14:useLocalDpi xmlns:a14="http://schemas.microsoft.com/office/drawing/2010/main"/>
               </a:ext>
             </a:extLst>
           </a:blip>
@@ -1814,29 +1875,32 @@
           <p:nvPr userDrawn="1"/>
         </p:nvPicPr>
         <p:blipFill>
-          <a:blip r:embed="rId9">
+          <a:blip r:embed="rId9" cstate="hqprint">
             <a:extLst>
               <a:ext uri="{BEBA8EAE-BF5A-486C-A8C5-ECC9F3942E4B}">
                 <a14:imgProps xmlns:a14="http://schemas.microsoft.com/office/drawing/2010/main">
                   <a14:imgLayer r:embed="rId10">
                     <a14:imgEffect>
-                      <a14:backgroundRemoval t="26834" b="66547" l="33301" r="66797">
-                        <a14:foregroundMark x1="41211" y1="27191" x2="47852" y2="27191"/>
-                        <a14:foregroundMark x1="52441" y1="26834" x2="58398" y2="26834"/>
-                        <a14:foregroundMark x1="42383" y1="46869" x2="44824" y2="51878"/>
-                        <a14:foregroundMark x1="52246" y1="35063" x2="56934" y2="42397"/>
-                        <a14:foregroundMark x1="56934" y1="31664" x2="56738" y2="38640"/>
-                        <a14:foregroundMark x1="41797" y1="30590" x2="41992" y2="33274"/>
-                        <a14:foregroundMark x1="42090" y1="64043" x2="49219" y2="66547"/>
-                        <a14:foregroundMark x1="49219" y1="66547" x2="58984" y2="63864"/>
+                      <a14:backgroundRemoval t="9020" b="95686" l="10000" r="89767">
+                        <a14:foregroundMark x1="28837" y1="9804" x2="44651" y2="9804"/>
+                        <a14:foregroundMark x1="55581" y1="9020" x2="69767" y2="9020"/>
+                        <a14:foregroundMark x1="31628" y1="52941" x2="37442" y2="63922"/>
+                        <a14:foregroundMark x1="55116" y1="27059" x2="66279" y2="43137"/>
+                        <a14:foregroundMark x1="66279" y1="19608" x2="65814" y2="34902"/>
+                        <a14:foregroundMark x1="30233" y1="17255" x2="30698" y2="23137"/>
+                        <a14:foregroundMark x1="30930" y1="90588" x2="47907" y2="96078"/>
+                        <a14:foregroundMark x1="47907" y1="96078" x2="71163" y2="90196"/>
                       </a14:backgroundRemoval>
                     </a14:imgEffect>
                   </a14:imgLayer>
                 </a14:imgProps>
               </a:ext>
+              <a:ext uri="{28A0092B-C50C-407E-A947-70E740481C1C}">
+                <a14:useLocalDpi xmlns:a14="http://schemas.microsoft.com/office/drawing/2010/main"/>
+              </a:ext>
             </a:extLst>
           </a:blip>
-          <a:srcRect l="29120" t="22634" r="28939" b="31637"/>
+          <a:srcRect/>
           <a:stretch/>
         </p:blipFill>
         <p:spPr>
@@ -2948,7 +3012,13 @@
           <p:nvPr userDrawn="1"/>
         </p:nvPicPr>
         <p:blipFill>
-          <a:blip r:embed="rId11"/>
+          <a:blip r:embed="rId11" cstate="hqprint">
+            <a:extLst>
+              <a:ext uri="{28A0092B-C50C-407E-A947-70E740481C1C}">
+                <a14:useLocalDpi xmlns:a14="http://schemas.microsoft.com/office/drawing/2010/main"/>
+              </a:ext>
+            </a:extLst>
+          </a:blip>
           <a:stretch>
             <a:fillRect/>
           </a:stretch>
@@ -2978,7 +3048,7 @@
           <p:nvPr userDrawn="1"/>
         </p:nvPicPr>
         <p:blipFill>
-          <a:blip r:embed="rId12">
+          <a:blip r:embed="rId12" cstate="hqprint">
             <a:clrChange>
               <a:clrFrom>
                 <a:srgbClr val="FFFFFF"/>
@@ -2991,14 +3061,14 @@
             </a:clrChange>
             <a:extLst>
               <a:ext uri="{28A0092B-C50C-407E-A947-70E740481C1C}">
-                <a14:useLocalDpi xmlns:a14="http://schemas.microsoft.com/office/drawing/2010/main" val="0"/>
+                <a14:useLocalDpi xmlns:a14="http://schemas.microsoft.com/office/drawing/2010/main"/>
               </a:ext>
               <a:ext uri="{837473B0-CC2E-450A-ABE3-18F120FF3D39}">
                 <a1611:picAttrSrcUrl xmlns:a1611="http://schemas.microsoft.com/office/drawing/2016/11/main" r:id="rId13"/>
               </a:ext>
             </a:extLst>
           </a:blip>
-          <a:srcRect l="10752" t="26565" r="14031" b="26894"/>
+          <a:srcRect/>
           <a:stretch/>
         </p:blipFill>
         <p:spPr>
@@ -3013,61 +3083,54 @@
       </p:pic>
       <p:sp>
         <p:nvSpPr>
-          <p:cNvPr id="5" name="ph_hosp_date_range">
+          <p:cNvPr id="2" name="Rectangle 1">
             <a:extLst>
               <a:ext uri="{FF2B5EF4-FFF2-40B4-BE49-F238E27FC236}">
-                <a16:creationId xmlns:a16="http://schemas.microsoft.com/office/drawing/2014/main" id="{BC9ACC09-72D2-F111-D0CD-9876D08F6412}"/>
+                <a16:creationId xmlns:a16="http://schemas.microsoft.com/office/drawing/2014/main" id="{4EA715C1-D099-5522-9B8D-6FE225FA3DB4}"/>
               </a:ext>
             </a:extLst>
           </p:cNvPr>
-          <p:cNvSpPr>
-            <a:spLocks noGrp="1"/>
-          </p:cNvSpPr>
-          <p:nvPr>
-            <p:ph type="body" sz="quarter" idx="32" hasCustomPrompt="1"/>
-          </p:nvPr>
+          <p:cNvSpPr/>
+          <p:nvPr userDrawn="1"/>
         </p:nvSpPr>
         <p:spPr>
-          <a:xfrm>
-            <a:off x="2764526" y="2483176"/>
-            <a:ext cx="1058500" cy="639646"/>
+          <a:xfrm rot="20997267">
+            <a:off x="2782260" y="2371528"/>
+            <a:ext cx="1431931" cy="407786"/>
           </a:xfrm>
-          <a:prstGeom prst="roundRect">
+          <a:prstGeom prst="rect">
             <a:avLst/>
           </a:prstGeom>
           <a:solidFill>
-            <a:srgbClr val="C11A1C"/>
+            <a:srgbClr val="FF0000"/>
           </a:solidFill>
           <a:ln>
-            <a:solidFill>
-              <a:srgbClr val="551B3C"/>
-            </a:solidFill>
+            <a:noFill/>
           </a:ln>
         </p:spPr>
+        <p:style>
+          <a:lnRef idx="2">
+            <a:schemeClr val="accent1">
+              <a:shade val="15000"/>
+            </a:schemeClr>
+          </a:lnRef>
+          <a:fillRef idx="1">
+            <a:schemeClr val="accent1"/>
+          </a:fillRef>
+          <a:effectRef idx="0">
+            <a:schemeClr val="accent1"/>
+          </a:effectRef>
+          <a:fontRef idx="minor">
+            <a:schemeClr val="lt1"/>
+          </a:fontRef>
+        </p:style>
         <p:txBody>
-          <a:bodyPr anchor="b" anchorCtr="0"/>
-          <a:lstStyle>
-            <a:lvl1pPr marL="0" indent="0" algn="ctr">
-              <a:buNone/>
-              <a:defRPr sz="1100">
-                <a:solidFill>
-                  <a:schemeClr val="bg1"/>
-                </a:solidFill>
-              </a:defRPr>
-            </a:lvl1pPr>
-            <a:lvl5pPr marL="1371600" indent="0" algn="l">
-              <a:buNone/>
-              <a:defRPr>
-                <a:solidFill>
-                  <a:schemeClr val="bg1"/>
-                </a:solidFill>
-              </a:defRPr>
-            </a:lvl5pPr>
-          </a:lstStyle>
+          <a:bodyPr rtlCol="0" anchor="ctr"/>
+          <a:lstStyle/>
           <a:p>
-            <a:pPr lvl="0"/>
+            <a:pPr lvl="0" algn="ctr"/>
             <a:r>
-              <a:rPr lang="en-AU" dirty="0"/>
+              <a:rPr lang="en-AU" sz="1100" dirty="0"/>
               <a:t>All data is artificially generated!</a:t>
             </a:r>
           </a:p>
@@ -3332,7 +3395,7 @@
           <p:nvPr userDrawn="1"/>
         </p:nvPicPr>
         <p:blipFill>
-          <a:blip r:embed="rId3">
+          <a:blip r:embed="rId3" cstate="hqprint">
             <a:clrChange>
               <a:clrFrom>
                 <a:srgbClr val="FCFCFC"/>
@@ -3374,6 +3437,9 @@
                     </a14:imgEffect>
                   </a14:imgLayer>
                 </a14:imgProps>
+              </a:ext>
+              <a:ext uri="{28A0092B-C50C-407E-A947-70E740481C1C}">
+                <a14:useLocalDpi xmlns:a14="http://schemas.microsoft.com/office/drawing/2010/main"/>
               </a:ext>
             </a:extLst>
           </a:blip>
@@ -6928,7 +6994,7 @@
         <p:spPr>
           <a:xfrm>
             <a:off x="192570" y="5457660"/>
-            <a:ext cx="3004069" cy="437783"/>
+            <a:ext cx="1945149" cy="967854"/>
           </a:xfrm>
           <a:prstGeom prst="rect">
             <a:avLst/>
@@ -6960,8 +7026,8 @@
         </p:nvSpPr>
         <p:spPr>
           <a:xfrm>
-            <a:off x="4214845" y="2216893"/>
-            <a:ext cx="2607441" cy="614090"/>
+            <a:off x="4905632" y="2216893"/>
+            <a:ext cx="1916654" cy="614090"/>
           </a:xfrm>
           <a:prstGeom prst="rect">
             <a:avLst/>
@@ -7026,7 +7092,7 @@
         </p:nvSpPr>
         <p:spPr>
           <a:xfrm>
-            <a:off x="4134555" y="6734402"/>
+            <a:off x="4152495" y="8229570"/>
             <a:ext cx="2623018" cy="620712"/>
           </a:xfrm>
           <a:prstGeom prst="rect">
@@ -7059,7 +7125,7 @@
         </p:nvSpPr>
         <p:spPr>
           <a:xfrm>
-            <a:off x="5292060" y="5458388"/>
+            <a:off x="5292060" y="5896551"/>
             <a:ext cx="1465513" cy="673021"/>
           </a:xfrm>
           <a:prstGeom prst="rect">
@@ -7136,7 +7202,7 @@
           <a:bodyPr/>
           <a:lstStyle/>
           <a:p>
-            <a:endParaRPr lang="en-AU"/>
+            <a:endParaRPr lang="en-AU" dirty="0"/>
           </a:p>
         </p:txBody>
       </p:sp>
@@ -7158,8 +7224,8 @@
         </p:nvSpPr>
         <p:spPr>
           <a:xfrm>
-            <a:off x="167027" y="1714499"/>
-            <a:ext cx="2930033" cy="855705"/>
+            <a:off x="167028" y="1714499"/>
+            <a:ext cx="1266356" cy="855705"/>
           </a:xfrm>
           <a:prstGeom prst="rect">
             <a:avLst/>

</xml_diff>